<commit_message>
pdf of ppt added
</commit_message>
<xml_diff>
--- a/Phase-1/Advanced Vehicle Safety System.pptx
+++ b/Phase-1/Advanced Vehicle Safety System.pptx
@@ -11873,23 +11873,15 @@
             </a:r>
             <a:r>
               <a:rPr lang="en-US" sz="1500" dirty="0"/>
-              <a:t>Driver Assistance System using Raspberry Pi and</a:t>
+              <a:t>Driver Assistance System using Raspberry </a:t>
             </a:r>
-          </a:p>
-          <a:p>
-            <a:pPr marL="457200" lvl="0" indent="-323850" algn="l" rtl="0">
-              <a:spcBef>
-                <a:spcPts val="0"/>
-              </a:spcBef>
-              <a:spcAft>
-                <a:spcPts val="0"/>
-              </a:spcAft>
-              <a:buSzPts val="1500"/>
-              <a:buChar char="●"/>
-            </a:pPr>
+            <a:r>
+              <a:rPr lang="en-US" sz="1500"/>
+              <a:t>Pi and Harr </a:t>
+            </a:r>
             <a:r>
               <a:rPr lang="en-US" sz="1500" dirty="0"/>
-              <a:t>Harr Cascade Classifiers”(IEEE Xplore Part Number: CFP21K74-ART; ISBN: 978-0-7381-1327-2)</a:t>
+              <a:t>Cascade Classifiers”(IEEE Xplore Part Number: CFP21K74-ART; ISBN: 978-0-7381-1327-2)</a:t>
             </a:r>
           </a:p>
           <a:p>

</xml_diff>